<commit_message>
Re #803 design presentation
</commit_message>
<xml_diff>
--- a/documentation/presentations/MatlabHoraceDesign.pptx
+++ b/documentation/presentations/MatlabHoraceDesign.pptx
@@ -248,7 +248,7 @@
           <a:p>
             <a:fld id="{683EADBB-3071-433F-B899-09B8AA0EFCFC}" type="datetimeFigureOut">
               <a:rPr lang="en-GB" smtClean="0"/>
-              <a:t>16/05/2019</a:t>
+              <a:t>19/10/2022</a:t>
             </a:fld>
             <a:endParaRPr lang="en-GB"/>
           </a:p>
@@ -418,7 +418,7 @@
           <a:p>
             <a:fld id="{683EADBB-3071-433F-B899-09B8AA0EFCFC}" type="datetimeFigureOut">
               <a:rPr lang="en-GB" smtClean="0"/>
-              <a:t>16/05/2019</a:t>
+              <a:t>19/10/2022</a:t>
             </a:fld>
             <a:endParaRPr lang="en-GB"/>
           </a:p>
@@ -598,7 +598,7 @@
           <a:p>
             <a:fld id="{683EADBB-3071-433F-B899-09B8AA0EFCFC}" type="datetimeFigureOut">
               <a:rPr lang="en-GB" smtClean="0"/>
-              <a:t>16/05/2019</a:t>
+              <a:t>19/10/2022</a:t>
             </a:fld>
             <a:endParaRPr lang="en-GB"/>
           </a:p>
@@ -768,7 +768,7 @@
           <a:p>
             <a:fld id="{683EADBB-3071-433F-B899-09B8AA0EFCFC}" type="datetimeFigureOut">
               <a:rPr lang="en-GB" smtClean="0"/>
-              <a:t>16/05/2019</a:t>
+              <a:t>19/10/2022</a:t>
             </a:fld>
             <a:endParaRPr lang="en-GB"/>
           </a:p>
@@ -1014,7 +1014,7 @@
           <a:p>
             <a:fld id="{683EADBB-3071-433F-B899-09B8AA0EFCFC}" type="datetimeFigureOut">
               <a:rPr lang="en-GB" smtClean="0"/>
-              <a:t>16/05/2019</a:t>
+              <a:t>19/10/2022</a:t>
             </a:fld>
             <a:endParaRPr lang="en-GB"/>
           </a:p>
@@ -1246,7 +1246,7 @@
           <a:p>
             <a:fld id="{683EADBB-3071-433F-B899-09B8AA0EFCFC}" type="datetimeFigureOut">
               <a:rPr lang="en-GB" smtClean="0"/>
-              <a:t>16/05/2019</a:t>
+              <a:t>19/10/2022</a:t>
             </a:fld>
             <a:endParaRPr lang="en-GB"/>
           </a:p>
@@ -1613,7 +1613,7 @@
           <a:p>
             <a:fld id="{683EADBB-3071-433F-B899-09B8AA0EFCFC}" type="datetimeFigureOut">
               <a:rPr lang="en-GB" smtClean="0"/>
-              <a:t>16/05/2019</a:t>
+              <a:t>19/10/2022</a:t>
             </a:fld>
             <a:endParaRPr lang="en-GB"/>
           </a:p>
@@ -1731,7 +1731,7 @@
           <a:p>
             <a:fld id="{683EADBB-3071-433F-B899-09B8AA0EFCFC}" type="datetimeFigureOut">
               <a:rPr lang="en-GB" smtClean="0"/>
-              <a:t>16/05/2019</a:t>
+              <a:t>19/10/2022</a:t>
             </a:fld>
             <a:endParaRPr lang="en-GB"/>
           </a:p>
@@ -1826,7 +1826,7 @@
           <a:p>
             <a:fld id="{683EADBB-3071-433F-B899-09B8AA0EFCFC}" type="datetimeFigureOut">
               <a:rPr lang="en-GB" smtClean="0"/>
-              <a:t>16/05/2019</a:t>
+              <a:t>19/10/2022</a:t>
             </a:fld>
             <a:endParaRPr lang="en-GB"/>
           </a:p>
@@ -2103,7 +2103,7 @@
           <a:p>
             <a:fld id="{683EADBB-3071-433F-B899-09B8AA0EFCFC}" type="datetimeFigureOut">
               <a:rPr lang="en-GB" smtClean="0"/>
-              <a:t>16/05/2019</a:t>
+              <a:t>19/10/2022</a:t>
             </a:fld>
             <a:endParaRPr lang="en-GB"/>
           </a:p>
@@ -2356,7 +2356,7 @@
           <a:p>
             <a:fld id="{683EADBB-3071-433F-B899-09B8AA0EFCFC}" type="datetimeFigureOut">
               <a:rPr lang="en-GB" smtClean="0"/>
-              <a:t>16/05/2019</a:t>
+              <a:t>19/10/2022</a:t>
             </a:fld>
             <a:endParaRPr lang="en-GB"/>
           </a:p>
@@ -2569,7 +2569,7 @@
           <a:p>
             <a:fld id="{683EADBB-3071-433F-B899-09B8AA0EFCFC}" type="datetimeFigureOut">
               <a:rPr lang="en-GB" smtClean="0"/>
-              <a:t>16/05/2019</a:t>
+              <a:t>19/10/2022</a:t>
             </a:fld>
             <a:endParaRPr lang="en-GB"/>
           </a:p>
@@ -13441,7 +13441,7 @@
           <a:graphicData uri="http://schemas.openxmlformats.org/presentationml/2006/ole">
             <mc:AlternateContent xmlns:mc="http://schemas.openxmlformats.org/markup-compatibility/2006">
               <mc:Choice xmlns:v="urn:schemas-microsoft-com:vml" Requires="v">
-                <p:oleObj spid="_x0000_s3087" name="Visio" r:id="rId3" imgW="9667926" imgH="6153150" progId="Visio.Drawing.15">
+                <p:oleObj spid="_x0000_s3088" name="Visio" r:id="rId3" imgW="9667926" imgH="6153150" progId="Visio.Drawing.15">
                   <p:embed/>
                 </p:oleObj>
               </mc:Choice>

</xml_diff>